<commit_message>
Modified for fixing issues
</commit_message>
<xml_diff>
--- a/service_images/startuppitch/myservicenned_pitch.pptx
+++ b/service_images/startuppitch/myservicenned_pitch.pptx
@@ -115,7 +115,7 @@
   </p:defaultTextStyle>
   <p:extLst>
     <p:ext uri="{EFAFB233-063F-42B5-8137-9DF3F51BA10A}">
-      <p15:sldGuideLst xmlns:p15="http://schemas.microsoft.com/office/powerpoint/2012/main">
+      <p15:sldGuideLst xmlns:p15="http://schemas.microsoft.com/office/powerpoint/2012/main" xmlns="">
         <p15:guide id="1" orient="horz" pos="2880">
           <p15:clr>
             <a:srgbClr val="A4A3A4"/>
@@ -298,7 +298,7 @@
           <a:p>
             <a:fld id="{1D8BD707-D9CF-40AE-B4C6-C98DA3205C09}" type="datetimeFigureOut">
               <a:rPr lang="en-US"/>
-              <a:t>3/24/2017</a:t>
+              <a:t>3/25/2017</a:t>
             </a:fld>
             <a:endParaRPr lang="en-US"/>
           </a:p>
@@ -502,7 +502,7 @@
           <a:p>
             <a:fld id="{1D8BD707-D9CF-40AE-B4C6-C98DA3205C09}" type="datetimeFigureOut">
               <a:rPr lang="en-US"/>
-              <a:t>3/24/2017</a:t>
+              <a:t>3/25/2017</a:t>
             </a:fld>
             <a:endParaRPr lang="en-US"/>
           </a:p>
@@ -743,7 +743,7 @@
           <a:p>
             <a:fld id="{1D8BD707-D9CF-40AE-B4C6-C98DA3205C09}" type="datetimeFigureOut">
               <a:rPr lang="en-US"/>
-              <a:t>3/24/2017</a:t>
+              <a:t>3/25/2017</a:t>
             </a:fld>
             <a:endParaRPr lang="en-US"/>
           </a:p>
@@ -918,7 +918,7 @@
           <a:p>
             <a:fld id="{1D8BD707-D9CF-40AE-B4C6-C98DA3205C09}" type="datetimeFigureOut">
               <a:rPr lang="en-US"/>
-              <a:t>3/24/2017</a:t>
+              <a:t>3/25/2017</a:t>
             </a:fld>
             <a:endParaRPr lang="en-US"/>
           </a:p>
@@ -1064,7 +1064,7 @@
           <a:p>
             <a:fld id="{1D8BD707-D9CF-40AE-B4C6-C98DA3205C09}" type="datetimeFigureOut">
               <a:rPr lang="en-US"/>
-              <a:t>3/24/2017</a:t>
+              <a:t>3/25/2017</a:t>
             </a:fld>
             <a:endParaRPr lang="en-US"/>
           </a:p>
@@ -1313,7 +1313,7 @@
           <a:p>
             <a:fld id="{1D8BD707-D9CF-40AE-B4C6-C98DA3205C09}" type="datetimeFigureOut">
               <a:rPr lang="en-US"/>
-              <a:t>3/24/2017</a:t>
+              <a:t>3/25/2017</a:t>
             </a:fld>
             <a:endParaRPr lang="en-US"/>
           </a:p>
@@ -1708,7 +1708,7 @@
               </a:rPr>
               <a:t>1</a:t>
             </a:r>
-            <a:endParaRPr sz="3600">
+            <a:endParaRPr sz="3600" dirty="0">
               <a:latin typeface="Arial Rounded MT Bold"/>
               <a:cs typeface="Arial Rounded MT Bold"/>
             </a:endParaRPr>
@@ -2325,8 +2325,13 @@
           <a:p>
             <a:r>
               <a:rPr lang="en-US" dirty="0"/>
-              <a:t>What Services we have?</a:t>
-            </a:r>
+              <a:t>What Services </a:t>
+            </a:r>
+            <a:r>
+              <a:rPr lang="en-US" dirty="0" smtClean="0"/>
+              <a:t>people can share?</a:t>
+            </a:r>
+            <a:endParaRPr lang="en-US" dirty="0"/>
           </a:p>
         </p:txBody>
       </p:sp>
@@ -2342,15 +2347,204 @@
         </p:nvSpPr>
         <p:spPr>
           <a:xfrm>
-            <a:off x="762000" y="990600"/>
-            <a:ext cx="7198207" cy="5410200"/>
+            <a:off x="381000" y="838200"/>
+            <a:ext cx="8153400" cy="4678204"/>
           </a:xfrm>
         </p:spPr>
         <p:txBody>
           <a:bodyPr/>
           <a:lstStyle/>
           <a:p>
-            <a:endParaRPr lang="en-US" dirty="0"/>
+            <a:endParaRPr lang="en-US" sz="2400" dirty="0" smtClean="0">
+              <a:latin typeface="Arial" panose="020B0604020202020204" pitchFamily="34" charset="0"/>
+              <a:cs typeface="Arial" panose="020B0604020202020204" pitchFamily="34" charset="0"/>
+            </a:endParaRPr>
+          </a:p>
+          <a:p>
+            <a:endParaRPr lang="en-US" sz="2400" dirty="0">
+              <a:latin typeface="Arial" panose="020B0604020202020204" pitchFamily="34" charset="0"/>
+              <a:cs typeface="Arial" panose="020B0604020202020204" pitchFamily="34" charset="0"/>
+            </a:endParaRPr>
+          </a:p>
+          <a:p>
+            <a:r>
+              <a:rPr lang="en-US" sz="2600" kern="1200" spc="-5" dirty="0">
+                <a:solidFill>
+                  <a:srgbClr val="7E7E7E"/>
+                </a:solidFill>
+                <a:latin typeface="Arial"/>
+                <a:cs typeface="Arial"/>
+              </a:rPr>
+              <a:t>1</a:t>
+            </a:r>
+            <a:r>
+              <a:rPr lang="en-US" sz="2600" kern="1200" spc="-5" dirty="0">
+                <a:solidFill>
+                  <a:srgbClr val="7E7E7E"/>
+                </a:solidFill>
+                <a:latin typeface="Arial"/>
+                <a:cs typeface="Arial"/>
+              </a:rPr>
+              <a:t>) Event Services</a:t>
+            </a:r>
+          </a:p>
+          <a:p>
+            <a:r>
+              <a:rPr lang="en-US" sz="2600" kern="1200" spc="-5" dirty="0">
+                <a:solidFill>
+                  <a:srgbClr val="7E7E7E"/>
+                </a:solidFill>
+                <a:latin typeface="Arial"/>
+                <a:cs typeface="Arial"/>
+              </a:rPr>
+              <a:t>2) House/Construction Work</a:t>
+            </a:r>
+          </a:p>
+          <a:p>
+            <a:r>
+              <a:rPr lang="en-US" sz="2600" kern="1200" spc="-5" dirty="0">
+                <a:solidFill>
+                  <a:srgbClr val="7E7E7E"/>
+                </a:solidFill>
+                <a:latin typeface="Arial"/>
+                <a:cs typeface="Arial"/>
+              </a:rPr>
+              <a:t>3) Appliance Repair Services </a:t>
+            </a:r>
+          </a:p>
+          <a:p>
+            <a:r>
+              <a:rPr lang="en-US" sz="2600" kern="1200" spc="-5" dirty="0">
+                <a:solidFill>
+                  <a:srgbClr val="7E7E7E"/>
+                </a:solidFill>
+                <a:latin typeface="Arial"/>
+                <a:cs typeface="Arial"/>
+              </a:rPr>
+              <a:t>4) Vehicle Services </a:t>
+            </a:r>
+          </a:p>
+          <a:p>
+            <a:r>
+              <a:rPr lang="en-US" sz="2600" kern="1200" spc="-5" dirty="0">
+                <a:solidFill>
+                  <a:srgbClr val="7E7E7E"/>
+                </a:solidFill>
+                <a:latin typeface="Arial"/>
+                <a:cs typeface="Arial"/>
+              </a:rPr>
+              <a:t>5) Health Services </a:t>
+            </a:r>
+          </a:p>
+          <a:p>
+            <a:r>
+              <a:rPr lang="en-US" sz="2600" kern="1200" spc="-5" dirty="0">
+                <a:solidFill>
+                  <a:srgbClr val="7E7E7E"/>
+                </a:solidFill>
+                <a:latin typeface="Arial"/>
+                <a:cs typeface="Arial"/>
+              </a:rPr>
+              <a:t>6) Agriculture Services</a:t>
+            </a:r>
+          </a:p>
+          <a:p>
+            <a:r>
+              <a:rPr lang="en-US" sz="2600" kern="1200" spc="-5" dirty="0">
+                <a:solidFill>
+                  <a:srgbClr val="7E7E7E"/>
+                </a:solidFill>
+                <a:latin typeface="Arial"/>
+                <a:cs typeface="Arial"/>
+              </a:rPr>
+              <a:t>7) Social Services </a:t>
+            </a:r>
+          </a:p>
+          <a:p>
+            <a:r>
+              <a:rPr lang="en-US" sz="2600" kern="1200" spc="-5" dirty="0">
+                <a:solidFill>
+                  <a:srgbClr val="7E7E7E"/>
+                </a:solidFill>
+                <a:latin typeface="Arial"/>
+                <a:cs typeface="Arial"/>
+              </a:rPr>
+              <a:t>8) Sports Services </a:t>
+            </a:r>
+            <a:r>
+              <a:rPr lang="en-US" sz="2600" kern="1200" spc="-5" dirty="0">
+                <a:solidFill>
+                  <a:srgbClr val="7E7E7E"/>
+                </a:solidFill>
+                <a:latin typeface="Arial"/>
+                <a:cs typeface="Arial"/>
+              </a:rPr>
+              <a:t>and more</a:t>
+            </a:r>
+          </a:p>
+          <a:p>
+            <a:endParaRPr lang="en-US" sz="2400" dirty="0">
+              <a:latin typeface="Arial" panose="020B0604020202020204" pitchFamily="34" charset="0"/>
+              <a:cs typeface="Arial" panose="020B0604020202020204" pitchFamily="34" charset="0"/>
+            </a:endParaRPr>
+          </a:p>
+          <a:p>
+            <a:r>
+              <a:rPr lang="en-US" sz="2400" dirty="0" smtClean="0">
+                <a:solidFill>
+                  <a:srgbClr val="FFC000"/>
+                </a:solidFill>
+                <a:latin typeface="Arial" panose="020B0604020202020204" pitchFamily="34" charset="0"/>
+                <a:cs typeface="Arial" panose="020B0604020202020204" pitchFamily="34" charset="0"/>
+              </a:rPr>
+              <a:t>List will get added with more services</a:t>
+            </a:r>
+            <a:endParaRPr lang="en-US" sz="2400" dirty="0">
+              <a:solidFill>
+                <a:srgbClr val="FFC000"/>
+              </a:solidFill>
+              <a:latin typeface="Arial" panose="020B0604020202020204" pitchFamily="34" charset="0"/>
+              <a:cs typeface="Arial" panose="020B0604020202020204" pitchFamily="34" charset="0"/>
+            </a:endParaRPr>
+          </a:p>
+        </p:txBody>
+      </p:sp>
+      <p:sp>
+        <p:nvSpPr>
+          <p:cNvPr id="4" name="TextBox 3"/>
+          <p:cNvSpPr txBox="1"/>
+          <p:nvPr/>
+        </p:nvSpPr>
+        <p:spPr>
+          <a:xfrm>
+            <a:off x="8610600" y="381000"/>
+            <a:ext cx="458780" cy="553998"/>
+          </a:xfrm>
+          <a:prstGeom prst="rect">
+            <a:avLst/>
+          </a:prstGeom>
+        </p:spPr>
+        <p:txBody>
+          <a:bodyPr wrap="square" lIns="0" tIns="0" rIns="0" bIns="0">
+            <a:spAutoFit/>
+          </a:bodyPr>
+          <a:lstStyle>
+            <a:lvl1pPr>
+              <a:defRPr sz="3600" b="1" i="0">
+                <a:solidFill>
+                  <a:srgbClr val="129CEB"/>
+                </a:solidFill>
+                <a:latin typeface="Arial Rounded MT Bold"/>
+                <a:ea typeface="+mj-ea"/>
+                <a:cs typeface="Arial Rounded MT Bold"/>
+              </a:defRPr>
+            </a:lvl1pPr>
+          </a:lstStyle>
+          <a:p>
+            <a:r>
+              <a:rPr lang="en-US" dirty="0"/>
+              <a:t>2</a:t>
+            </a:r>
           </a:p>
         </p:txBody>
       </p:sp>
@@ -2497,16 +2691,16 @@
               </a:lnSpc>
             </a:pPr>
             <a:r>
-              <a:rPr sz="3600" dirty="0">
+              <a:rPr lang="en-US" sz="3600" dirty="0">
                 <a:solidFill>
                   <a:srgbClr val="129CEB"/>
                 </a:solidFill>
                 <a:latin typeface="Arial Rounded MT Bold"/>
                 <a:cs typeface="Arial Rounded MT Bold"/>
               </a:rPr>
-              <a:t>2</a:t>
-            </a:r>
-            <a:endParaRPr sz="3600">
+              <a:t>3</a:t>
+            </a:r>
+            <a:endParaRPr sz="3600" dirty="0">
               <a:latin typeface="Arial Rounded MT Bold"/>
               <a:cs typeface="Arial Rounded MT Bold"/>
             </a:endParaRPr>
@@ -2896,16 +3090,16 @@
               </a:lnSpc>
             </a:pPr>
             <a:r>
-              <a:rPr sz="3600" dirty="0">
+              <a:rPr lang="en-US" sz="3600" dirty="0">
                 <a:solidFill>
                   <a:srgbClr val="129CEB"/>
                 </a:solidFill>
                 <a:latin typeface="Arial Rounded MT Bold"/>
                 <a:cs typeface="Arial Rounded MT Bold"/>
               </a:rPr>
-              <a:t>3</a:t>
-            </a:r>
-            <a:endParaRPr sz="3600">
+              <a:t>4</a:t>
+            </a:r>
+            <a:endParaRPr sz="3600" dirty="0">
               <a:latin typeface="Arial Rounded MT Bold"/>
               <a:cs typeface="Arial Rounded MT Bold"/>
             </a:endParaRPr>
@@ -3478,8 +3672,8 @@
         </p:nvSpPr>
         <p:spPr>
           <a:xfrm>
-            <a:off x="225652" y="162178"/>
-            <a:ext cx="8918347" cy="828422"/>
+            <a:off x="225653" y="162178"/>
+            <a:ext cx="8232548" cy="828422"/>
           </a:xfrm>
         </p:spPr>
         <p:txBody>
@@ -3487,9 +3681,10 @@
           <a:lstStyle/>
           <a:p>
             <a:r>
-              <a:rPr lang="en-US" dirty="0"/>
+              <a:rPr lang="en-US" dirty="0" smtClean="0"/>
               <a:t>Establishing Network: Our First Priority</a:t>
             </a:r>
+            <a:endParaRPr lang="en-US" dirty="0"/>
           </a:p>
         </p:txBody>
       </p:sp>
@@ -3650,6 +3845,48 @@
           </a:p>
         </p:txBody>
       </p:sp>
+      <p:sp>
+        <p:nvSpPr>
+          <p:cNvPr id="5" name="TextBox 4"/>
+          <p:cNvSpPr txBox="1"/>
+          <p:nvPr/>
+        </p:nvSpPr>
+        <p:spPr>
+          <a:xfrm>
+            <a:off x="8730669" y="228600"/>
+            <a:ext cx="458780" cy="923330"/>
+          </a:xfrm>
+          <a:prstGeom prst="rect">
+            <a:avLst/>
+          </a:prstGeom>
+          <a:noFill/>
+        </p:spPr>
+        <p:txBody>
+          <a:bodyPr wrap="none" rtlCol="0">
+            <a:spAutoFit/>
+          </a:bodyPr>
+          <a:lstStyle/>
+          <a:p>
+            <a:r>
+              <a:rPr lang="en-US" sz="3600" dirty="0" smtClean="0">
+                <a:solidFill>
+                  <a:srgbClr val="129CEB"/>
+                </a:solidFill>
+                <a:latin typeface="Arial Rounded MT Bold"/>
+                <a:cs typeface="Arial Rounded MT Bold"/>
+              </a:rPr>
+              <a:t>5</a:t>
+            </a:r>
+            <a:endParaRPr lang="en-US" sz="3600" dirty="0">
+              <a:latin typeface="Arial Rounded MT Bold"/>
+              <a:cs typeface="Arial Rounded MT Bold"/>
+            </a:endParaRPr>
+          </a:p>
+          <a:p>
+            <a:endParaRPr lang="en-US" dirty="0"/>
+          </a:p>
+        </p:txBody>
+      </p:sp>
     </p:spTree>
     <p:extLst>
       <p:ext uri="{BB962C8B-B14F-4D97-AF65-F5344CB8AC3E}">
@@ -3748,16 +3985,16 @@
               </a:lnSpc>
             </a:pPr>
             <a:r>
-              <a:rPr sz="3600" dirty="0">
+              <a:rPr lang="en-US" sz="3600" dirty="0">
                 <a:solidFill>
                   <a:srgbClr val="129CEB"/>
                 </a:solidFill>
                 <a:latin typeface="Arial Rounded MT Bold"/>
                 <a:cs typeface="Arial Rounded MT Bold"/>
               </a:rPr>
-              <a:t>5</a:t>
-            </a:r>
-            <a:endParaRPr sz="3600">
+              <a:t>6</a:t>
+            </a:r>
+            <a:endParaRPr sz="3600" dirty="0">
               <a:latin typeface="Arial Rounded MT Bold"/>
               <a:cs typeface="Arial Rounded MT Bold"/>
             </a:endParaRPr>
@@ -5781,7 +6018,14 @@
                 <a:latin typeface="Calibri"/>
                 <a:cs typeface="Calibri"/>
               </a:rPr>
-              <a:t>     1million</a:t>
+              <a:t>     </a:t>
+            </a:r>
+            <a:r>
+              <a:rPr lang="en-US" sz="2800" dirty="0" smtClean="0">
+                <a:latin typeface="Calibri"/>
+                <a:cs typeface="Calibri"/>
+              </a:rPr>
+              <a:t>1Million</a:t>
             </a:r>
             <a:endParaRPr sz="2800" dirty="0">
               <a:latin typeface="Calibri"/>
@@ -6049,16 +6293,16 @@
               </a:lnSpc>
             </a:pPr>
             <a:r>
-              <a:rPr sz="3600" dirty="0">
+              <a:rPr lang="en-US" sz="3600" dirty="0">
                 <a:solidFill>
                   <a:srgbClr val="129CEB"/>
                 </a:solidFill>
                 <a:latin typeface="Arial Rounded MT Bold"/>
                 <a:cs typeface="Arial Rounded MT Bold"/>
               </a:rPr>
-              <a:t>6</a:t>
-            </a:r>
-            <a:endParaRPr sz="3600">
+              <a:t>7</a:t>
+            </a:r>
+            <a:endParaRPr sz="3600" dirty="0">
               <a:latin typeface="Arial Rounded MT Bold"/>
               <a:cs typeface="Arial Rounded MT Bold"/>
             </a:endParaRPr>
@@ -7153,16 +7397,16 @@
               </a:lnSpc>
             </a:pPr>
             <a:r>
-              <a:rPr sz="3600" dirty="0">
+              <a:rPr lang="en-US" sz="3600" dirty="0">
                 <a:solidFill>
                   <a:srgbClr val="129CEB"/>
                 </a:solidFill>
                 <a:latin typeface="Arial Rounded MT Bold"/>
                 <a:cs typeface="Arial Rounded MT Bold"/>
               </a:rPr>
-              <a:t>7</a:t>
-            </a:r>
-            <a:endParaRPr sz="3600">
+              <a:t>8</a:t>
+            </a:r>
+            <a:endParaRPr sz="3600" dirty="0">
               <a:latin typeface="Arial Rounded MT Bold"/>
               <a:cs typeface="Arial Rounded MT Bold"/>
             </a:endParaRPr>
@@ -8578,8 +8822,8 @@
         </p:nvSpPr>
         <p:spPr>
           <a:xfrm>
-            <a:off x="1102550" y="3383407"/>
-            <a:ext cx="7050850" cy="101599"/>
+            <a:off x="1150416" y="3434206"/>
+            <a:ext cx="7002984" cy="50800"/>
           </a:xfrm>
           <a:custGeom>
             <a:avLst/>
@@ -9200,8 +9444,8 @@
         </p:nvSpPr>
         <p:spPr>
           <a:xfrm>
-            <a:off x="2590800" y="2514600"/>
-            <a:ext cx="4267200" cy="2514600"/>
+            <a:off x="2119745" y="2299855"/>
+            <a:ext cx="4953000" cy="2895600"/>
           </a:xfrm>
           <a:custGeom>
             <a:avLst/>
@@ -9250,7 +9494,7 @@
           <a:lstStyle/>
           <a:p>
             <a:r>
-              <a:rPr lang="en-US" sz="2800" dirty="0">
+              <a:rPr lang="en-US" sz="2400" dirty="0">
                 <a:solidFill>
                   <a:schemeClr val="tx2"/>
                 </a:solidFill>
@@ -9258,14 +9502,14 @@
               <a:t>           </a:t>
             </a:r>
             <a:r>
-              <a:rPr lang="en-US" sz="2800" dirty="0" err="1">
+              <a:rPr lang="en-US" sz="2400" dirty="0" err="1">
                 <a:solidFill>
                   <a:schemeClr val="tx2"/>
                 </a:solidFill>
               </a:rPr>
               <a:t>Urbanclap</a:t>
             </a:r>
-            <a:endParaRPr lang="en-US" sz="2800" dirty="0">
+            <a:endParaRPr lang="en-US" sz="2400" dirty="0">
               <a:solidFill>
                 <a:schemeClr val="tx2"/>
               </a:solidFill>
@@ -9273,7 +9517,7 @@
           </a:p>
           <a:p>
             <a:r>
-              <a:rPr lang="en-US" sz="2800" dirty="0">
+              <a:rPr lang="en-US" sz="2400" dirty="0">
                 <a:solidFill>
                   <a:schemeClr val="tx2"/>
                 </a:solidFill>
@@ -9281,7 +9525,7 @@
               <a:t>           </a:t>
             </a:r>
             <a:r>
-              <a:rPr lang="en-US" sz="2800" dirty="0" err="1">
+              <a:rPr lang="en-US" sz="2400" dirty="0" err="1">
                 <a:solidFill>
                   <a:schemeClr val="tx2"/>
                 </a:solidFill>
@@ -9289,7 +9533,7 @@
               <a:t>Ramukaka</a:t>
             </a:r>
             <a:r>
-              <a:rPr lang="en-US" sz="2800" dirty="0">
+              <a:rPr lang="en-US" sz="2400" dirty="0">
                 <a:solidFill>
                   <a:schemeClr val="tx2"/>
                 </a:solidFill>
@@ -9299,7 +9543,7 @@
           </a:p>
           <a:p>
             <a:r>
-              <a:rPr lang="en-US" sz="2800" dirty="0">
+              <a:rPr lang="en-US" sz="2400" dirty="0">
                 <a:solidFill>
                   <a:schemeClr val="tx2"/>
                 </a:solidFill>
@@ -9307,14 +9551,14 @@
               <a:t>           </a:t>
             </a:r>
             <a:r>
-              <a:rPr lang="en-US" sz="2800" dirty="0" err="1">
+              <a:rPr lang="en-US" sz="2400" dirty="0" err="1">
                 <a:solidFill>
                   <a:schemeClr val="tx2"/>
                 </a:solidFill>
               </a:rPr>
               <a:t>Sulekha</a:t>
             </a:r>
-            <a:endParaRPr lang="en-US" sz="2800" dirty="0">
+            <a:endParaRPr lang="en-US" sz="2400" dirty="0">
               <a:solidFill>
                 <a:schemeClr val="tx2"/>
               </a:solidFill>
@@ -9322,7 +9566,7 @@
           </a:p>
           <a:p>
             <a:r>
-              <a:rPr lang="en-US" sz="2800" dirty="0">
+              <a:rPr lang="en-US" sz="2400" dirty="0">
                 <a:solidFill>
                   <a:schemeClr val="tx2"/>
                 </a:solidFill>
@@ -9330,14 +9574,14 @@
               <a:t>           </a:t>
             </a:r>
             <a:r>
-              <a:rPr lang="en-US" sz="2800" dirty="0" err="1">
+              <a:rPr lang="en-US" sz="2400" dirty="0" err="1" smtClean="0">
                 <a:solidFill>
                   <a:schemeClr val="tx2"/>
                 </a:solidFill>
               </a:rPr>
               <a:t>Quikr</a:t>
             </a:r>
-            <a:endParaRPr lang="en-US" sz="2800" dirty="0">
+            <a:endParaRPr lang="en-US" sz="2400" dirty="0" smtClean="0">
               <a:solidFill>
                 <a:schemeClr val="tx2"/>
               </a:solidFill>
@@ -9345,12 +9589,35 @@
           </a:p>
           <a:p>
             <a:r>
+              <a:rPr lang="en-US" sz="2400" dirty="0" smtClean="0">
+                <a:solidFill>
+                  <a:schemeClr val="tx2"/>
+                </a:solidFill>
+              </a:rPr>
+              <a:t>           Freelancer</a:t>
+            </a:r>
+            <a:endParaRPr lang="en-US" sz="2400" dirty="0">
+              <a:solidFill>
+                <a:schemeClr val="tx2"/>
+              </a:solidFill>
+            </a:endParaRPr>
+          </a:p>
+          <a:p>
+            <a:r>
+              <a:rPr lang="en-US" sz="2400" dirty="0">
+                <a:solidFill>
+                  <a:schemeClr val="tx2"/>
+                </a:solidFill>
+              </a:rPr>
+              <a:t>           Other sites</a:t>
+            </a:r>
+            <a:r>
               <a:rPr lang="en-US" sz="2800" dirty="0">
                 <a:solidFill>
                   <a:schemeClr val="tx2"/>
                 </a:solidFill>
               </a:rPr>
-              <a:t>           Other sites </a:t>
+              <a:t> </a:t>
             </a:r>
           </a:p>
           <a:p>
@@ -9360,8 +9627,53 @@
                   <a:schemeClr val="tx2"/>
                 </a:solidFill>
               </a:rPr>
-              <a:t>  (exist in some areas we are providing)</a:t>
-            </a:r>
+              <a:t>  (</a:t>
+            </a:r>
+            <a:r>
+              <a:rPr lang="en-US" sz="2000" dirty="0">
+                <a:solidFill>
+                  <a:srgbClr val="FF0000"/>
+                </a:solidFill>
+              </a:rPr>
+              <a:t>exist in some </a:t>
+            </a:r>
+            <a:r>
+              <a:rPr lang="en-US" sz="2000" dirty="0" smtClean="0">
+                <a:solidFill>
+                  <a:srgbClr val="FF0000"/>
+                </a:solidFill>
+              </a:rPr>
+              <a:t>service areas  we </a:t>
+            </a:r>
+            <a:r>
+              <a:rPr lang="en-US" sz="2000" dirty="0">
+                <a:solidFill>
+                  <a:srgbClr val="FF0000"/>
+                </a:solidFill>
+              </a:rPr>
+              <a:t>are </a:t>
+            </a:r>
+            <a:r>
+              <a:rPr lang="en-US" sz="2000" dirty="0" smtClean="0">
+                <a:solidFill>
+                  <a:srgbClr val="FF0000"/>
+                </a:solidFill>
+              </a:rPr>
+              <a:t>allowing as social platform</a:t>
+            </a:r>
+            <a:r>
+              <a:rPr lang="en-US" sz="2000" dirty="0" smtClean="0">
+                <a:solidFill>
+                  <a:schemeClr val="tx2"/>
+                </a:solidFill>
+              </a:rPr>
+              <a:t>)</a:t>
+            </a:r>
+            <a:endParaRPr lang="en-US" sz="2000" dirty="0">
+              <a:solidFill>
+                <a:schemeClr val="tx2"/>
+              </a:solidFill>
+            </a:endParaRPr>
           </a:p>
           <a:p>
             <a:endParaRPr dirty="0"/>
@@ -9492,7 +9804,7 @@
         </p:nvSpPr>
         <p:spPr>
           <a:xfrm>
-            <a:off x="6994017" y="3060953"/>
+            <a:off x="7171690" y="3060953"/>
             <a:ext cx="1896110" cy="266700"/>
           </a:xfrm>
           <a:prstGeom prst="rect">
@@ -9555,7 +9867,7 @@
         </p:nvSpPr>
         <p:spPr>
           <a:xfrm>
-            <a:off x="175056" y="3060953"/>
+            <a:off x="-45720" y="3060953"/>
             <a:ext cx="1950720" cy="266700"/>
           </a:xfrm>
           <a:prstGeom prst="rect">

</xml_diff>